<commit_message>
updated slides and diagrams
</commit_message>
<xml_diff>
--- a/documentation and slides/Business use case for Mall app.pptx
+++ b/documentation and slides/Business use case for Mall app.pptx
@@ -9,17 +9,17 @@
   </p:notesMasterIdLst>
   <p:sldIdLst>
     <p:sldId id="256" r:id="rId2"/>
-    <p:sldId id="260" r:id="rId3"/>
-    <p:sldId id="261" r:id="rId4"/>
-    <p:sldId id="262" r:id="rId5"/>
-    <p:sldId id="263" r:id="rId6"/>
-    <p:sldId id="257" r:id="rId7"/>
-    <p:sldId id="258" r:id="rId8"/>
-    <p:sldId id="259" r:id="rId9"/>
-    <p:sldId id="266" r:id="rId10"/>
-    <p:sldId id="264" r:id="rId11"/>
-    <p:sldId id="265" r:id="rId12"/>
-    <p:sldId id="267" r:id="rId13"/>
+    <p:sldId id="262" r:id="rId3"/>
+    <p:sldId id="266" r:id="rId4"/>
+    <p:sldId id="264" r:id="rId5"/>
+    <p:sldId id="265" r:id="rId6"/>
+    <p:sldId id="267" r:id="rId7"/>
+    <p:sldId id="268" r:id="rId8"/>
+    <p:sldId id="269" r:id="rId9"/>
+    <p:sldId id="271" r:id="rId10"/>
+    <p:sldId id="272" r:id="rId11"/>
+    <p:sldId id="273" r:id="rId12"/>
+    <p:sldId id="270" r:id="rId13"/>
   </p:sldIdLst>
   <p:sldSz cx="12192000" cy="6858000"/>
   <p:notesSz cx="6858000" cy="9144000"/>
@@ -544,7 +544,7 @@
           <a:p>
             <a:fld id="{DFB9A418-7326-4BE6-954C-A9F1F8BBEE5B}" type="slidenum">
               <a:rPr lang="en-MY" smtClean="0"/>
-              <a:t>9</a:t>
+              <a:t>3</a:t>
             </a:fld>
             <a:endParaRPr lang="en-MY"/>
           </a:p>
@@ -631,7 +631,7 @@
           <a:p>
             <a:fld id="{DFB9A418-7326-4BE6-954C-A9F1F8BBEE5B}" type="slidenum">
               <a:rPr lang="en-MY" smtClean="0"/>
-              <a:t>10</a:t>
+              <a:t>4</a:t>
             </a:fld>
             <a:endParaRPr lang="en-MY"/>
           </a:p>
@@ -715,7 +715,7 @@
           <a:p>
             <a:fld id="{DFB9A418-7326-4BE6-954C-A9F1F8BBEE5B}" type="slidenum">
               <a:rPr lang="en-MY" smtClean="0"/>
-              <a:t>11</a:t>
+              <a:t>5</a:t>
             </a:fld>
             <a:endParaRPr lang="en-MY"/>
           </a:p>
@@ -4057,6 +4057,507 @@
           <p:cNvPr id="2" name="Title 1">
             <a:extLst>
               <a:ext uri="{FF2B5EF4-FFF2-40B4-BE49-F238E27FC236}">
+                <a16:creationId xmlns:a16="http://schemas.microsoft.com/office/drawing/2014/main" id="{D3F2A38B-8222-49F1-9BE3-5A634D6699E3}"/>
+              </a:ext>
+            </a:extLst>
+          </p:cNvPr>
+          <p:cNvSpPr>
+            <a:spLocks noGrp="1"/>
+          </p:cNvSpPr>
+          <p:nvPr>
+            <p:ph type="title"/>
+          </p:nvPr>
+        </p:nvSpPr>
+        <p:spPr/>
+        <p:txBody>
+          <a:bodyPr/>
+          <a:lstStyle/>
+          <a:p>
+            <a:r>
+              <a:rPr lang="en-MY" dirty="0"/>
+              <a:t>Use case – Events and Promotions</a:t>
+            </a:r>
+          </a:p>
+        </p:txBody>
+      </p:sp>
+      <p:sp>
+        <p:nvSpPr>
+          <p:cNvPr id="6" name="Content Placeholder 5">
+            <a:extLst>
+              <a:ext uri="{FF2B5EF4-FFF2-40B4-BE49-F238E27FC236}">
+                <a16:creationId xmlns:a16="http://schemas.microsoft.com/office/drawing/2014/main" id="{CE745D0E-BF92-4519-BEE1-E63AF365348B}"/>
+              </a:ext>
+            </a:extLst>
+          </p:cNvPr>
+          <p:cNvSpPr>
+            <a:spLocks noGrp="1"/>
+          </p:cNvSpPr>
+          <p:nvPr>
+            <p:ph idx="1"/>
+          </p:nvPr>
+        </p:nvSpPr>
+        <p:spPr/>
+        <p:txBody>
+          <a:bodyPr/>
+          <a:lstStyle/>
+          <a:p>
+            <a:endParaRPr lang="en-MY"/>
+          </a:p>
+        </p:txBody>
+      </p:sp>
+      <p:pic>
+        <p:nvPicPr>
+          <p:cNvPr id="7" name="Picture 6">
+            <a:extLst>
+              <a:ext uri="{FF2B5EF4-FFF2-40B4-BE49-F238E27FC236}">
+                <a16:creationId xmlns:a16="http://schemas.microsoft.com/office/drawing/2014/main" id="{BB7AE2EB-3A1E-4CFF-AFBD-72FAD9081740}"/>
+              </a:ext>
+            </a:extLst>
+          </p:cNvPr>
+          <p:cNvPicPr>
+            <a:picLocks noChangeAspect="1"/>
+          </p:cNvPicPr>
+          <p:nvPr/>
+        </p:nvPicPr>
+        <p:blipFill>
+          <a:blip r:embed="rId2"/>
+          <a:stretch>
+            <a:fillRect/>
+          </a:stretch>
+        </p:blipFill>
+        <p:spPr>
+          <a:xfrm>
+            <a:off x="1033317" y="2635409"/>
+            <a:ext cx="10125365" cy="2731770"/>
+          </a:xfrm>
+          <a:prstGeom prst="rect">
+            <a:avLst/>
+          </a:prstGeom>
+        </p:spPr>
+      </p:pic>
+    </p:spTree>
+    <p:extLst>
+      <p:ext uri="{BB962C8B-B14F-4D97-AF65-F5344CB8AC3E}">
+        <p14:creationId xmlns:p14="http://schemas.microsoft.com/office/powerpoint/2010/main" val="1495580608"/>
+      </p:ext>
+    </p:extLst>
+  </p:cSld>
+  <p:clrMapOvr>
+    <a:masterClrMapping/>
+  </p:clrMapOvr>
+</p:sld>
+</file>
+
+<file path=ppt/slides/slide11.xml><?xml version="1.0" encoding="utf-8"?>
+<p:sld xmlns:a="http://schemas.openxmlformats.org/drawingml/2006/main" xmlns:r="http://schemas.openxmlformats.org/officeDocument/2006/relationships" xmlns:p="http://schemas.openxmlformats.org/presentationml/2006/main">
+  <p:cSld>
+    <p:spTree>
+      <p:nvGrpSpPr>
+        <p:cNvPr id="1" name=""/>
+        <p:cNvGrpSpPr/>
+        <p:nvPr/>
+      </p:nvGrpSpPr>
+      <p:grpSpPr>
+        <a:xfrm>
+          <a:off x="0" y="0"/>
+          <a:ext cx="0" cy="0"/>
+          <a:chOff x="0" y="0"/>
+          <a:chExt cx="0" cy="0"/>
+        </a:xfrm>
+      </p:grpSpPr>
+      <p:sp>
+        <p:nvSpPr>
+          <p:cNvPr id="2" name="Title 1">
+            <a:extLst>
+              <a:ext uri="{FF2B5EF4-FFF2-40B4-BE49-F238E27FC236}">
+                <a16:creationId xmlns:a16="http://schemas.microsoft.com/office/drawing/2014/main" id="{954CE6E6-836F-4C88-AB6E-666F6C94A494}"/>
+              </a:ext>
+            </a:extLst>
+          </p:cNvPr>
+          <p:cNvSpPr>
+            <a:spLocks noGrp="1"/>
+          </p:cNvSpPr>
+          <p:nvPr>
+            <p:ph type="title"/>
+          </p:nvPr>
+        </p:nvSpPr>
+        <p:spPr/>
+        <p:txBody>
+          <a:bodyPr/>
+          <a:lstStyle/>
+          <a:p>
+            <a:r>
+              <a:rPr lang="en-MY" dirty="0"/>
+              <a:t>Use case – Location and Services</a:t>
+            </a:r>
+          </a:p>
+        </p:txBody>
+      </p:sp>
+      <p:pic>
+        <p:nvPicPr>
+          <p:cNvPr id="4" name="Picture 3">
+            <a:extLst>
+              <a:ext uri="{FF2B5EF4-FFF2-40B4-BE49-F238E27FC236}">
+                <a16:creationId xmlns:a16="http://schemas.microsoft.com/office/drawing/2014/main" id="{2B1B6141-A506-45B7-9296-62CD70370B63}"/>
+              </a:ext>
+            </a:extLst>
+          </p:cNvPr>
+          <p:cNvPicPr>
+            <a:picLocks noChangeAspect="1"/>
+          </p:cNvPicPr>
+          <p:nvPr/>
+        </p:nvPicPr>
+        <p:blipFill>
+          <a:blip r:embed="rId2"/>
+          <a:stretch>
+            <a:fillRect/>
+          </a:stretch>
+        </p:blipFill>
+        <p:spPr>
+          <a:xfrm>
+            <a:off x="1290637" y="2029619"/>
+            <a:ext cx="9610725" cy="3943350"/>
+          </a:xfrm>
+          <a:prstGeom prst="rect">
+            <a:avLst/>
+          </a:prstGeom>
+        </p:spPr>
+      </p:pic>
+    </p:spTree>
+    <p:extLst>
+      <p:ext uri="{BB962C8B-B14F-4D97-AF65-F5344CB8AC3E}">
+        <p14:creationId xmlns:p14="http://schemas.microsoft.com/office/powerpoint/2010/main" val="1687359200"/>
+      </p:ext>
+    </p:extLst>
+  </p:cSld>
+  <p:clrMapOvr>
+    <a:masterClrMapping/>
+  </p:clrMapOvr>
+</p:sld>
+</file>
+
+<file path=ppt/slides/slide12.xml><?xml version="1.0" encoding="utf-8"?>
+<p:sld xmlns:a="http://schemas.openxmlformats.org/drawingml/2006/main" xmlns:r="http://schemas.openxmlformats.org/officeDocument/2006/relationships" xmlns:p="http://schemas.openxmlformats.org/presentationml/2006/main">
+  <p:cSld>
+    <p:spTree>
+      <p:nvGrpSpPr>
+        <p:cNvPr id="1" name=""/>
+        <p:cNvGrpSpPr/>
+        <p:nvPr/>
+      </p:nvGrpSpPr>
+      <p:grpSpPr>
+        <a:xfrm>
+          <a:off x="0" y="0"/>
+          <a:ext cx="0" cy="0"/>
+          <a:chOff x="0" y="0"/>
+          <a:chExt cx="0" cy="0"/>
+        </a:xfrm>
+      </p:grpSpPr>
+      <p:sp>
+        <p:nvSpPr>
+          <p:cNvPr id="2" name="Title 1">
+            <a:extLst>
+              <a:ext uri="{FF2B5EF4-FFF2-40B4-BE49-F238E27FC236}">
+                <a16:creationId xmlns:a16="http://schemas.microsoft.com/office/drawing/2014/main" id="{CEB2B7F6-5698-4A9F-BD58-A9D862F2003F}"/>
+              </a:ext>
+            </a:extLst>
+          </p:cNvPr>
+          <p:cNvSpPr>
+            <a:spLocks noGrp="1"/>
+          </p:cNvSpPr>
+          <p:nvPr>
+            <p:ph type="title"/>
+          </p:nvPr>
+        </p:nvSpPr>
+        <p:spPr>
+          <a:xfrm>
+            <a:off x="838200" y="365125"/>
+            <a:ext cx="10515600" cy="1029333"/>
+          </a:xfrm>
+        </p:spPr>
+        <p:txBody>
+          <a:bodyPr/>
+          <a:lstStyle/>
+          <a:p>
+            <a:r>
+              <a:rPr lang="en-MY" dirty="0"/>
+              <a:t>Software Architecture Diagram</a:t>
+            </a:r>
+          </a:p>
+        </p:txBody>
+      </p:sp>
+      <p:pic>
+        <p:nvPicPr>
+          <p:cNvPr id="9" name="Picture 8">
+            <a:extLst>
+              <a:ext uri="{FF2B5EF4-FFF2-40B4-BE49-F238E27FC236}">
+                <a16:creationId xmlns:a16="http://schemas.microsoft.com/office/drawing/2014/main" id="{E32EDAD8-F242-45AE-A533-74341699CE2B}"/>
+              </a:ext>
+            </a:extLst>
+          </p:cNvPr>
+          <p:cNvPicPr>
+            <a:picLocks noChangeAspect="1"/>
+          </p:cNvPicPr>
+          <p:nvPr/>
+        </p:nvPicPr>
+        <p:blipFill>
+          <a:blip r:embed="rId2"/>
+          <a:stretch>
+            <a:fillRect/>
+          </a:stretch>
+        </p:blipFill>
+        <p:spPr>
+          <a:xfrm>
+            <a:off x="2453640" y="1394458"/>
+            <a:ext cx="7284720" cy="5463542"/>
+          </a:xfrm>
+          <a:prstGeom prst="rect">
+            <a:avLst/>
+          </a:prstGeom>
+        </p:spPr>
+      </p:pic>
+    </p:spTree>
+    <p:extLst>
+      <p:ext uri="{BB962C8B-B14F-4D97-AF65-F5344CB8AC3E}">
+        <p14:creationId xmlns:p14="http://schemas.microsoft.com/office/powerpoint/2010/main" val="1147396994"/>
+      </p:ext>
+    </p:extLst>
+  </p:cSld>
+  <p:clrMapOvr>
+    <a:masterClrMapping/>
+  </p:clrMapOvr>
+</p:sld>
+</file>
+
+<file path=ppt/slides/slide2.xml><?xml version="1.0" encoding="utf-8"?>
+<p:sld xmlns:a="http://schemas.openxmlformats.org/drawingml/2006/main" xmlns:r="http://schemas.openxmlformats.org/officeDocument/2006/relationships" xmlns:p="http://schemas.openxmlformats.org/presentationml/2006/main">
+  <p:cSld>
+    <p:spTree>
+      <p:nvGrpSpPr>
+        <p:cNvPr id="1" name=""/>
+        <p:cNvGrpSpPr/>
+        <p:nvPr/>
+      </p:nvGrpSpPr>
+      <p:grpSpPr>
+        <a:xfrm>
+          <a:off x="0" y="0"/>
+          <a:ext cx="0" cy="0"/>
+          <a:chOff x="0" y="0"/>
+          <a:chExt cx="0" cy="0"/>
+        </a:xfrm>
+      </p:grpSpPr>
+      <p:sp>
+        <p:nvSpPr>
+          <p:cNvPr id="2" name="Title 1">
+            <a:extLst>
+              <a:ext uri="{FF2B5EF4-FFF2-40B4-BE49-F238E27FC236}">
+                <a16:creationId xmlns:a16="http://schemas.microsoft.com/office/drawing/2014/main" id="{CA92ADFD-9164-468D-BCE3-31FD25DBE500}"/>
+              </a:ext>
+            </a:extLst>
+          </p:cNvPr>
+          <p:cNvSpPr>
+            <a:spLocks noGrp="1"/>
+          </p:cNvSpPr>
+          <p:nvPr>
+            <p:ph type="title"/>
+          </p:nvPr>
+        </p:nvSpPr>
+        <p:spPr/>
+        <p:txBody>
+          <a:bodyPr/>
+          <a:lstStyle/>
+          <a:p>
+            <a:r>
+              <a:rPr lang="en-MY" dirty="0"/>
+              <a:t>Problem</a:t>
+            </a:r>
+          </a:p>
+        </p:txBody>
+      </p:sp>
+      <p:sp>
+        <p:nvSpPr>
+          <p:cNvPr id="3" name="Content Placeholder 2">
+            <a:extLst>
+              <a:ext uri="{FF2B5EF4-FFF2-40B4-BE49-F238E27FC236}">
+                <a16:creationId xmlns:a16="http://schemas.microsoft.com/office/drawing/2014/main" id="{DCC1B3A1-2652-490E-9482-A0FD30546EE5}"/>
+              </a:ext>
+            </a:extLst>
+          </p:cNvPr>
+          <p:cNvSpPr>
+            <a:spLocks noGrp="1"/>
+          </p:cNvSpPr>
+          <p:nvPr>
+            <p:ph idx="1"/>
+          </p:nvPr>
+        </p:nvSpPr>
+        <p:spPr/>
+        <p:txBody>
+          <a:bodyPr/>
+          <a:lstStyle/>
+          <a:p>
+            <a:r>
+              <a:rPr lang="en-US" dirty="0"/>
+              <a:t>Retail Space Property Owners suffer from loss of tenants and unable to collect rent</a:t>
+            </a:r>
+          </a:p>
+          <a:p>
+            <a:r>
+              <a:rPr lang="en-US" dirty="0"/>
+              <a:t>Shop Owners suffer from profitability loss because customers are moving to online shopping and E-commerce</a:t>
+            </a:r>
+            <a:endParaRPr lang="en-MY" dirty="0"/>
+          </a:p>
+          <a:p>
+            <a:endParaRPr lang="en-MY" dirty="0"/>
+          </a:p>
+        </p:txBody>
+      </p:sp>
+    </p:spTree>
+    <p:extLst>
+      <p:ext uri="{BB962C8B-B14F-4D97-AF65-F5344CB8AC3E}">
+        <p14:creationId xmlns:p14="http://schemas.microsoft.com/office/powerpoint/2010/main" val="1160152449"/>
+      </p:ext>
+    </p:extLst>
+  </p:cSld>
+  <p:clrMapOvr>
+    <a:masterClrMapping/>
+  </p:clrMapOvr>
+</p:sld>
+</file>
+
+<file path=ppt/slides/slide3.xml><?xml version="1.0" encoding="utf-8"?>
+<p:sld xmlns:a="http://schemas.openxmlformats.org/drawingml/2006/main" xmlns:r="http://schemas.openxmlformats.org/officeDocument/2006/relationships" xmlns:p="http://schemas.openxmlformats.org/presentationml/2006/main">
+  <p:cSld>
+    <p:spTree>
+      <p:nvGrpSpPr>
+        <p:cNvPr id="1" name=""/>
+        <p:cNvGrpSpPr/>
+        <p:nvPr/>
+      </p:nvGrpSpPr>
+      <p:grpSpPr>
+        <a:xfrm>
+          <a:off x="0" y="0"/>
+          <a:ext cx="0" cy="0"/>
+          <a:chOff x="0" y="0"/>
+          <a:chExt cx="0" cy="0"/>
+        </a:xfrm>
+      </p:grpSpPr>
+      <p:sp>
+        <p:nvSpPr>
+          <p:cNvPr id="2" name="Title 1">
+            <a:extLst>
+              <a:ext uri="{FF2B5EF4-FFF2-40B4-BE49-F238E27FC236}">
+                <a16:creationId xmlns:a16="http://schemas.microsoft.com/office/drawing/2014/main" id="{B71C4E1F-AA1F-48CA-B496-B8BCB12C82B8}"/>
+              </a:ext>
+            </a:extLst>
+          </p:cNvPr>
+          <p:cNvSpPr>
+            <a:spLocks noGrp="1"/>
+          </p:cNvSpPr>
+          <p:nvPr>
+            <p:ph type="title"/>
+          </p:nvPr>
+        </p:nvSpPr>
+        <p:spPr/>
+        <p:txBody>
+          <a:bodyPr/>
+          <a:lstStyle/>
+          <a:p>
+            <a:r>
+              <a:rPr lang="en-MY" dirty="0"/>
+              <a:t>Hypothesis</a:t>
+            </a:r>
+          </a:p>
+        </p:txBody>
+      </p:sp>
+      <p:sp>
+        <p:nvSpPr>
+          <p:cNvPr id="3" name="Content Placeholder 2">
+            <a:extLst>
+              <a:ext uri="{FF2B5EF4-FFF2-40B4-BE49-F238E27FC236}">
+                <a16:creationId xmlns:a16="http://schemas.microsoft.com/office/drawing/2014/main" id="{E6962A66-2322-43DF-8378-35FEE3F8889D}"/>
+              </a:ext>
+            </a:extLst>
+          </p:cNvPr>
+          <p:cNvSpPr>
+            <a:spLocks noGrp="1"/>
+          </p:cNvSpPr>
+          <p:nvPr>
+            <p:ph idx="1"/>
+          </p:nvPr>
+        </p:nvSpPr>
+        <p:spPr/>
+        <p:txBody>
+          <a:bodyPr/>
+          <a:lstStyle/>
+          <a:p>
+            <a:r>
+              <a:rPr lang="en-MY" dirty="0"/>
+              <a:t>Profitability problems of shop owners and landlords in the retail space can be solved by increasing the revenue of shop owners </a:t>
+            </a:r>
+            <a:r>
+              <a:rPr lang="en-MY" i="1" dirty="0"/>
+              <a:t>collectively</a:t>
+            </a:r>
+          </a:p>
+          <a:p>
+            <a:endParaRPr lang="en-MY" i="1" dirty="0"/>
+          </a:p>
+          <a:p>
+            <a:pPr marL="0" indent="0">
+              <a:buNone/>
+            </a:pPr>
+            <a:r>
+              <a:rPr lang="en-MY" dirty="0"/>
+              <a:t>Assumptions</a:t>
+            </a:r>
+          </a:p>
+          <a:p>
+            <a:r>
+              <a:rPr lang="en-MY" dirty="0"/>
+              <a:t>Retail space shop owners and landlords are in the shopping mall/commercial hub space</a:t>
+            </a:r>
+          </a:p>
+          <a:p>
+            <a:endParaRPr lang="en-MY" dirty="0"/>
+          </a:p>
+        </p:txBody>
+      </p:sp>
+    </p:spTree>
+    <p:extLst>
+      <p:ext uri="{BB962C8B-B14F-4D97-AF65-F5344CB8AC3E}">
+        <p14:creationId xmlns:p14="http://schemas.microsoft.com/office/powerpoint/2010/main" val="1960683299"/>
+      </p:ext>
+    </p:extLst>
+  </p:cSld>
+  <p:clrMapOvr>
+    <a:masterClrMapping/>
+  </p:clrMapOvr>
+</p:sld>
+</file>
+
+<file path=ppt/slides/slide4.xml><?xml version="1.0" encoding="utf-8"?>
+<p:sld xmlns:a="http://schemas.openxmlformats.org/drawingml/2006/main" xmlns:r="http://schemas.openxmlformats.org/officeDocument/2006/relationships" xmlns:p="http://schemas.openxmlformats.org/presentationml/2006/main">
+  <p:cSld>
+    <p:spTree>
+      <p:nvGrpSpPr>
+        <p:cNvPr id="1" name=""/>
+        <p:cNvGrpSpPr/>
+        <p:nvPr/>
+      </p:nvGrpSpPr>
+      <p:grpSpPr>
+        <a:xfrm>
+          <a:off x="0" y="0"/>
+          <a:ext cx="0" cy="0"/>
+          <a:chOff x="0" y="0"/>
+          <a:chExt cx="0" cy="0"/>
+        </a:xfrm>
+      </p:grpSpPr>
+      <p:sp>
+        <p:nvSpPr>
+          <p:cNvPr id="2" name="Title 1">
+            <a:extLst>
+              <a:ext uri="{FF2B5EF4-FFF2-40B4-BE49-F238E27FC236}">
                 <a16:creationId xmlns:a16="http://schemas.microsoft.com/office/drawing/2014/main" id="{3AFA084C-7C11-407B-A8C3-4C87CEB6AB2B}"/>
               </a:ext>
             </a:extLst>
@@ -4873,7 +5374,7 @@
 </p:sld>
 </file>
 
-<file path=ppt/slides/slide11.xml><?xml version="1.0" encoding="utf-8"?>
+<file path=ppt/slides/slide5.xml><?xml version="1.0" encoding="utf-8"?>
 <p:sld xmlns:a="http://schemas.openxmlformats.org/drawingml/2006/main" xmlns:r="http://schemas.openxmlformats.org/officeDocument/2006/relationships" xmlns:p="http://schemas.openxmlformats.org/presentationml/2006/main">
   <p:cSld>
     <p:spTree>
@@ -5705,495 +6206,6 @@
     <p:extLst>
       <p:ext uri="{BB962C8B-B14F-4D97-AF65-F5344CB8AC3E}">
         <p14:creationId xmlns:p14="http://schemas.microsoft.com/office/powerpoint/2010/main" val="267578266"/>
-      </p:ext>
-    </p:extLst>
-  </p:cSld>
-  <p:clrMapOvr>
-    <a:masterClrMapping/>
-  </p:clrMapOvr>
-</p:sld>
-</file>
-
-<file path=ppt/slides/slide12.xml><?xml version="1.0" encoding="utf-8"?>
-<p:sld xmlns:a="http://schemas.openxmlformats.org/drawingml/2006/main" xmlns:r="http://schemas.openxmlformats.org/officeDocument/2006/relationships" xmlns:p="http://schemas.openxmlformats.org/presentationml/2006/main">
-  <p:cSld>
-    <p:spTree>
-      <p:nvGrpSpPr>
-        <p:cNvPr id="1" name=""/>
-        <p:cNvGrpSpPr/>
-        <p:nvPr/>
-      </p:nvGrpSpPr>
-      <p:grpSpPr>
-        <a:xfrm>
-          <a:off x="0" y="0"/>
-          <a:ext cx="0" cy="0"/>
-          <a:chOff x="0" y="0"/>
-          <a:chExt cx="0" cy="0"/>
-        </a:xfrm>
-      </p:grpSpPr>
-      <p:sp>
-        <p:nvSpPr>
-          <p:cNvPr id="2" name="Title 1">
-            <a:extLst>
-              <a:ext uri="{FF2B5EF4-FFF2-40B4-BE49-F238E27FC236}">
-                <a16:creationId xmlns:a16="http://schemas.microsoft.com/office/drawing/2014/main" id="{32B56487-A801-4962-9E40-D9614C9A0675}"/>
-              </a:ext>
-            </a:extLst>
-          </p:cNvPr>
-          <p:cNvSpPr>
-            <a:spLocks noGrp="1"/>
-          </p:cNvSpPr>
-          <p:nvPr>
-            <p:ph type="title"/>
-          </p:nvPr>
-        </p:nvSpPr>
-        <p:spPr/>
-        <p:txBody>
-          <a:bodyPr/>
-          <a:lstStyle/>
-          <a:p>
-            <a:r>
-              <a:rPr lang="en-MY" dirty="0"/>
-              <a:t>Features</a:t>
-            </a:r>
-          </a:p>
-        </p:txBody>
-      </p:sp>
-      <p:sp>
-        <p:nvSpPr>
-          <p:cNvPr id="3" name="Content Placeholder 2">
-            <a:extLst>
-              <a:ext uri="{FF2B5EF4-FFF2-40B4-BE49-F238E27FC236}">
-                <a16:creationId xmlns:a16="http://schemas.microsoft.com/office/drawing/2014/main" id="{9829EB09-60D7-44BF-AECA-95532404D379}"/>
-              </a:ext>
-            </a:extLst>
-          </p:cNvPr>
-          <p:cNvSpPr>
-            <a:spLocks noGrp="1"/>
-          </p:cNvSpPr>
-          <p:nvPr>
-            <p:ph idx="1"/>
-          </p:nvPr>
-        </p:nvSpPr>
-        <p:spPr/>
-        <p:txBody>
-          <a:bodyPr/>
-          <a:lstStyle/>
-          <a:p>
-            <a:r>
-              <a:rPr lang="en-MY" dirty="0"/>
-              <a:t>Bundling</a:t>
-            </a:r>
-          </a:p>
-          <a:p>
-            <a:r>
-              <a:rPr lang="en-MY" dirty="0"/>
-              <a:t>Promotions</a:t>
-            </a:r>
-          </a:p>
-          <a:p>
-            <a:r>
-              <a:rPr lang="en-MY" dirty="0"/>
-              <a:t>Point Reward System</a:t>
-            </a:r>
-          </a:p>
-          <a:p>
-            <a:r>
-              <a:rPr lang="en-MY" dirty="0"/>
-              <a:t>Store Locator</a:t>
-            </a:r>
-          </a:p>
-          <a:p>
-            <a:r>
-              <a:rPr lang="en-MY" dirty="0"/>
-              <a:t>Parking Assist</a:t>
-            </a:r>
-          </a:p>
-          <a:p>
-            <a:r>
-              <a:rPr lang="en-MY" dirty="0"/>
-              <a:t>Auxiliary Services</a:t>
-            </a:r>
-          </a:p>
-          <a:p>
-            <a:r>
-              <a:rPr lang="en-MY" dirty="0"/>
-              <a:t>Event Information</a:t>
-            </a:r>
-          </a:p>
-        </p:txBody>
-      </p:sp>
-    </p:spTree>
-    <p:extLst>
-      <p:ext uri="{BB962C8B-B14F-4D97-AF65-F5344CB8AC3E}">
-        <p14:creationId xmlns:p14="http://schemas.microsoft.com/office/powerpoint/2010/main" val="1859594646"/>
-      </p:ext>
-    </p:extLst>
-  </p:cSld>
-  <p:clrMapOvr>
-    <a:masterClrMapping/>
-  </p:clrMapOvr>
-</p:sld>
-</file>
-
-<file path=ppt/slides/slide2.xml><?xml version="1.0" encoding="utf-8"?>
-<p:sld xmlns:a="http://schemas.openxmlformats.org/drawingml/2006/main" xmlns:r="http://schemas.openxmlformats.org/officeDocument/2006/relationships" xmlns:p="http://schemas.openxmlformats.org/presentationml/2006/main">
-  <p:cSld>
-    <p:spTree>
-      <p:nvGrpSpPr>
-        <p:cNvPr id="1" name=""/>
-        <p:cNvGrpSpPr/>
-        <p:nvPr/>
-      </p:nvGrpSpPr>
-      <p:grpSpPr>
-        <a:xfrm>
-          <a:off x="0" y="0"/>
-          <a:ext cx="0" cy="0"/>
-          <a:chOff x="0" y="0"/>
-          <a:chExt cx="0" cy="0"/>
-        </a:xfrm>
-      </p:grpSpPr>
-      <p:sp>
-        <p:nvSpPr>
-          <p:cNvPr id="2" name="Title 1">
-            <a:extLst>
-              <a:ext uri="{FF2B5EF4-FFF2-40B4-BE49-F238E27FC236}">
-                <a16:creationId xmlns:a16="http://schemas.microsoft.com/office/drawing/2014/main" id="{836B5DB6-8A11-42FD-A4A1-329C56F1ED10}"/>
-              </a:ext>
-            </a:extLst>
-          </p:cNvPr>
-          <p:cNvSpPr>
-            <a:spLocks noGrp="1"/>
-          </p:cNvSpPr>
-          <p:nvPr>
-            <p:ph type="title"/>
-          </p:nvPr>
-        </p:nvSpPr>
-        <p:spPr/>
-        <p:txBody>
-          <a:bodyPr/>
-          <a:lstStyle/>
-          <a:p>
-            <a:r>
-              <a:rPr lang="en-MY" dirty="0"/>
-              <a:t>Executive Summary</a:t>
-            </a:r>
-          </a:p>
-        </p:txBody>
-      </p:sp>
-      <p:sp>
-        <p:nvSpPr>
-          <p:cNvPr id="3" name="Content Placeholder 2">
-            <a:extLst>
-              <a:ext uri="{FF2B5EF4-FFF2-40B4-BE49-F238E27FC236}">
-                <a16:creationId xmlns:a16="http://schemas.microsoft.com/office/drawing/2014/main" id="{953710CA-84F2-4593-AF61-F35F7D0C9784}"/>
-              </a:ext>
-            </a:extLst>
-          </p:cNvPr>
-          <p:cNvSpPr>
-            <a:spLocks noGrp="1"/>
-          </p:cNvSpPr>
-          <p:nvPr>
-            <p:ph idx="1"/>
-          </p:nvPr>
-        </p:nvSpPr>
-        <p:spPr/>
-        <p:txBody>
-          <a:bodyPr/>
-          <a:lstStyle/>
-          <a:p>
-            <a:pPr marL="0" indent="0">
-              <a:buNone/>
-            </a:pPr>
-            <a:r>
-              <a:rPr lang="en-US" dirty="0"/>
-              <a:t>The executive summary introduces your company, explains what you do, and lays out what you’re looking for from your readers. </a:t>
-            </a:r>
-            <a:endParaRPr lang="en-MY" dirty="0"/>
-          </a:p>
-        </p:txBody>
-      </p:sp>
-    </p:spTree>
-    <p:extLst>
-      <p:ext uri="{BB962C8B-B14F-4D97-AF65-F5344CB8AC3E}">
-        <p14:creationId xmlns:p14="http://schemas.microsoft.com/office/powerpoint/2010/main" val="1957688456"/>
-      </p:ext>
-    </p:extLst>
-  </p:cSld>
-  <p:clrMapOvr>
-    <a:masterClrMapping/>
-  </p:clrMapOvr>
-</p:sld>
-</file>
-
-<file path=ppt/slides/slide3.xml><?xml version="1.0" encoding="utf-8"?>
-<p:sld xmlns:a="http://schemas.openxmlformats.org/drawingml/2006/main" xmlns:r="http://schemas.openxmlformats.org/officeDocument/2006/relationships" xmlns:p="http://schemas.openxmlformats.org/presentationml/2006/main">
-  <p:cSld>
-    <p:spTree>
-      <p:nvGrpSpPr>
-        <p:cNvPr id="1" name=""/>
-        <p:cNvGrpSpPr/>
-        <p:nvPr/>
-      </p:nvGrpSpPr>
-      <p:grpSpPr>
-        <a:xfrm>
-          <a:off x="0" y="0"/>
-          <a:ext cx="0" cy="0"/>
-          <a:chOff x="0" y="0"/>
-          <a:chExt cx="0" cy="0"/>
-        </a:xfrm>
-      </p:grpSpPr>
-      <p:sp>
-        <p:nvSpPr>
-          <p:cNvPr id="2" name="Title 1">
-            <a:extLst>
-              <a:ext uri="{FF2B5EF4-FFF2-40B4-BE49-F238E27FC236}">
-                <a16:creationId xmlns:a16="http://schemas.microsoft.com/office/drawing/2014/main" id="{581E3DA8-5CAE-4F9A-8BFC-EF6A72FCD619}"/>
-              </a:ext>
-            </a:extLst>
-          </p:cNvPr>
-          <p:cNvSpPr>
-            <a:spLocks noGrp="1"/>
-          </p:cNvSpPr>
-          <p:nvPr>
-            <p:ph type="title"/>
-          </p:nvPr>
-        </p:nvSpPr>
-        <p:spPr/>
-        <p:txBody>
-          <a:bodyPr/>
-          <a:lstStyle/>
-          <a:p>
-            <a:endParaRPr lang="en-MY"/>
-          </a:p>
-        </p:txBody>
-      </p:sp>
-      <p:sp>
-        <p:nvSpPr>
-          <p:cNvPr id="3" name="Content Placeholder 2">
-            <a:extLst>
-              <a:ext uri="{FF2B5EF4-FFF2-40B4-BE49-F238E27FC236}">
-                <a16:creationId xmlns:a16="http://schemas.microsoft.com/office/drawing/2014/main" id="{7CA3ED54-52D7-4D9E-A8E9-03A1E6B91AFA}"/>
-              </a:ext>
-            </a:extLst>
-          </p:cNvPr>
-          <p:cNvSpPr>
-            <a:spLocks noGrp="1"/>
-          </p:cNvSpPr>
-          <p:nvPr>
-            <p:ph idx="1"/>
-          </p:nvPr>
-        </p:nvSpPr>
-        <p:spPr/>
-        <p:txBody>
-          <a:bodyPr/>
-          <a:lstStyle/>
-          <a:p>
-            <a:r>
-              <a:rPr lang="en-MY" dirty="0"/>
-              <a:t>Problem</a:t>
-            </a:r>
-          </a:p>
-          <a:p>
-            <a:r>
-              <a:rPr lang="en-MY" dirty="0"/>
-              <a:t>Solution</a:t>
-            </a:r>
-          </a:p>
-          <a:p>
-            <a:r>
-              <a:rPr lang="en-MY" dirty="0"/>
-              <a:t>Target market</a:t>
-            </a:r>
-          </a:p>
-          <a:p>
-            <a:r>
-              <a:rPr lang="en-MY" dirty="0"/>
-              <a:t>Competition</a:t>
-            </a:r>
-          </a:p>
-        </p:txBody>
-      </p:sp>
-    </p:spTree>
-    <p:extLst>
-      <p:ext uri="{BB962C8B-B14F-4D97-AF65-F5344CB8AC3E}">
-        <p14:creationId xmlns:p14="http://schemas.microsoft.com/office/powerpoint/2010/main" val="1571279623"/>
-      </p:ext>
-    </p:extLst>
-  </p:cSld>
-  <p:clrMapOvr>
-    <a:masterClrMapping/>
-  </p:clrMapOvr>
-</p:sld>
-</file>
-
-<file path=ppt/slides/slide4.xml><?xml version="1.0" encoding="utf-8"?>
-<p:sld xmlns:a="http://schemas.openxmlformats.org/drawingml/2006/main" xmlns:r="http://schemas.openxmlformats.org/officeDocument/2006/relationships" xmlns:p="http://schemas.openxmlformats.org/presentationml/2006/main">
-  <p:cSld>
-    <p:spTree>
-      <p:nvGrpSpPr>
-        <p:cNvPr id="1" name=""/>
-        <p:cNvGrpSpPr/>
-        <p:nvPr/>
-      </p:nvGrpSpPr>
-      <p:grpSpPr>
-        <a:xfrm>
-          <a:off x="0" y="0"/>
-          <a:ext cx="0" cy="0"/>
-          <a:chOff x="0" y="0"/>
-          <a:chExt cx="0" cy="0"/>
-        </a:xfrm>
-      </p:grpSpPr>
-      <p:sp>
-        <p:nvSpPr>
-          <p:cNvPr id="2" name="Title 1">
-            <a:extLst>
-              <a:ext uri="{FF2B5EF4-FFF2-40B4-BE49-F238E27FC236}">
-                <a16:creationId xmlns:a16="http://schemas.microsoft.com/office/drawing/2014/main" id="{CA92ADFD-9164-468D-BCE3-31FD25DBE500}"/>
-              </a:ext>
-            </a:extLst>
-          </p:cNvPr>
-          <p:cNvSpPr>
-            <a:spLocks noGrp="1"/>
-          </p:cNvSpPr>
-          <p:nvPr>
-            <p:ph type="title"/>
-          </p:nvPr>
-        </p:nvSpPr>
-        <p:spPr/>
-        <p:txBody>
-          <a:bodyPr/>
-          <a:lstStyle/>
-          <a:p>
-            <a:r>
-              <a:rPr lang="en-MY" dirty="0"/>
-              <a:t>Problem</a:t>
-            </a:r>
-          </a:p>
-        </p:txBody>
-      </p:sp>
-      <p:sp>
-        <p:nvSpPr>
-          <p:cNvPr id="3" name="Content Placeholder 2">
-            <a:extLst>
-              <a:ext uri="{FF2B5EF4-FFF2-40B4-BE49-F238E27FC236}">
-                <a16:creationId xmlns:a16="http://schemas.microsoft.com/office/drawing/2014/main" id="{DCC1B3A1-2652-490E-9482-A0FD30546EE5}"/>
-              </a:ext>
-            </a:extLst>
-          </p:cNvPr>
-          <p:cNvSpPr>
-            <a:spLocks noGrp="1"/>
-          </p:cNvSpPr>
-          <p:nvPr>
-            <p:ph idx="1"/>
-          </p:nvPr>
-        </p:nvSpPr>
-        <p:spPr/>
-        <p:txBody>
-          <a:bodyPr/>
-          <a:lstStyle/>
-          <a:p>
-            <a:r>
-              <a:rPr lang="en-US" dirty="0"/>
-              <a:t>Retail Space Property Owners suffer from loss of tenants and unable to collect rent</a:t>
-            </a:r>
-          </a:p>
-          <a:p>
-            <a:r>
-              <a:rPr lang="en-US" dirty="0"/>
-              <a:t>Shop Owners suffer from profitability loss because customers are moving to online shopping and E-commerce</a:t>
-            </a:r>
-            <a:endParaRPr lang="en-MY" dirty="0"/>
-          </a:p>
-          <a:p>
-            <a:endParaRPr lang="en-MY" dirty="0"/>
-          </a:p>
-        </p:txBody>
-      </p:sp>
-    </p:spTree>
-    <p:extLst>
-      <p:ext uri="{BB962C8B-B14F-4D97-AF65-F5344CB8AC3E}">
-        <p14:creationId xmlns:p14="http://schemas.microsoft.com/office/powerpoint/2010/main" val="1160152449"/>
-      </p:ext>
-    </p:extLst>
-  </p:cSld>
-  <p:clrMapOvr>
-    <a:masterClrMapping/>
-  </p:clrMapOvr>
-</p:sld>
-</file>
-
-<file path=ppt/slides/slide5.xml><?xml version="1.0" encoding="utf-8"?>
-<p:sld xmlns:a="http://schemas.openxmlformats.org/drawingml/2006/main" xmlns:r="http://schemas.openxmlformats.org/officeDocument/2006/relationships" xmlns:p="http://schemas.openxmlformats.org/presentationml/2006/main">
-  <p:cSld>
-    <p:spTree>
-      <p:nvGrpSpPr>
-        <p:cNvPr id="1" name=""/>
-        <p:cNvGrpSpPr/>
-        <p:nvPr/>
-      </p:nvGrpSpPr>
-      <p:grpSpPr>
-        <a:xfrm>
-          <a:off x="0" y="0"/>
-          <a:ext cx="0" cy="0"/>
-          <a:chOff x="0" y="0"/>
-          <a:chExt cx="0" cy="0"/>
-        </a:xfrm>
-      </p:grpSpPr>
-      <p:sp>
-        <p:nvSpPr>
-          <p:cNvPr id="2" name="Title 1">
-            <a:extLst>
-              <a:ext uri="{FF2B5EF4-FFF2-40B4-BE49-F238E27FC236}">
-                <a16:creationId xmlns:a16="http://schemas.microsoft.com/office/drawing/2014/main" id="{8848C839-FA31-44C8-9F6B-14469B59D694}"/>
-              </a:ext>
-            </a:extLst>
-          </p:cNvPr>
-          <p:cNvSpPr>
-            <a:spLocks noGrp="1"/>
-          </p:cNvSpPr>
-          <p:nvPr>
-            <p:ph type="title"/>
-          </p:nvPr>
-        </p:nvSpPr>
-        <p:spPr/>
-        <p:txBody>
-          <a:bodyPr/>
-          <a:lstStyle/>
-          <a:p>
-            <a:endParaRPr lang="en-MY"/>
-          </a:p>
-        </p:txBody>
-      </p:sp>
-      <p:sp>
-        <p:nvSpPr>
-          <p:cNvPr id="3" name="Content Placeholder 2">
-            <a:extLst>
-              <a:ext uri="{FF2B5EF4-FFF2-40B4-BE49-F238E27FC236}">
-                <a16:creationId xmlns:a16="http://schemas.microsoft.com/office/drawing/2014/main" id="{D12D8367-18E9-45DD-BB5A-3EEE1D311920}"/>
-              </a:ext>
-            </a:extLst>
-          </p:cNvPr>
-          <p:cNvSpPr>
-            <a:spLocks noGrp="1"/>
-          </p:cNvSpPr>
-          <p:nvPr>
-            <p:ph idx="1"/>
-          </p:nvPr>
-        </p:nvSpPr>
-        <p:spPr/>
-        <p:txBody>
-          <a:bodyPr/>
-          <a:lstStyle/>
-          <a:p>
-            <a:endParaRPr lang="en-MY"/>
-          </a:p>
-        </p:txBody>
-      </p:sp>
-    </p:spTree>
-    <p:extLst>
-      <p:ext uri="{BB962C8B-B14F-4D97-AF65-F5344CB8AC3E}">
-        <p14:creationId xmlns:p14="http://schemas.microsoft.com/office/powerpoint/2010/main" val="3886156355"/>
       </p:ext>
     </p:extLst>
   </p:cSld>
@@ -6225,7 +6237,7 @@
           <p:cNvPr id="2" name="Title 1">
             <a:extLst>
               <a:ext uri="{FF2B5EF4-FFF2-40B4-BE49-F238E27FC236}">
-                <a16:creationId xmlns:a16="http://schemas.microsoft.com/office/drawing/2014/main" id="{D7BE496E-1A59-4436-A731-CAFA2388D1A9}"/>
+                <a16:creationId xmlns:a16="http://schemas.microsoft.com/office/drawing/2014/main" id="{32B56487-A801-4962-9E40-D9614C9A0675}"/>
               </a:ext>
             </a:extLst>
           </p:cNvPr>
@@ -6243,7 +6255,7 @@
           <a:p>
             <a:r>
               <a:rPr lang="en-MY" dirty="0"/>
-              <a:t>Opportunity</a:t>
+              <a:t>Features (Average Sales Price)</a:t>
             </a:r>
           </a:p>
         </p:txBody>
@@ -6253,7 +6265,7 @@
           <p:cNvPr id="3" name="Content Placeholder 2">
             <a:extLst>
               <a:ext uri="{FF2B5EF4-FFF2-40B4-BE49-F238E27FC236}">
-                <a16:creationId xmlns:a16="http://schemas.microsoft.com/office/drawing/2014/main" id="{CA8DED66-0711-46F6-AC23-CE0D6124075B}"/>
+                <a16:creationId xmlns:a16="http://schemas.microsoft.com/office/drawing/2014/main" id="{9829EB09-60D7-44BF-AECA-95532404D379}"/>
               </a:ext>
             </a:extLst>
           </p:cNvPr>
@@ -6264,14 +6276,68 @@
             <p:ph idx="1"/>
           </p:nvPr>
         </p:nvSpPr>
-        <p:spPr/>
-        <p:txBody>
-          <a:bodyPr/>
-          <a:lstStyle/>
-          <a:p>
-            <a:r>
-              <a:rPr lang="en-US" dirty="0"/>
-              <a:t>This section answers these questions: What are you actually selling and how are you solving a problem (or “need”) for your market? Who is your target market and competition? </a:t>
+        <p:spPr>
+          <a:xfrm>
+            <a:off x="838199" y="1825625"/>
+            <a:ext cx="10663989" cy="4351338"/>
+          </a:xfrm>
+        </p:spPr>
+        <p:txBody>
+          <a:bodyPr>
+            <a:normAutofit/>
+          </a:bodyPr>
+          <a:lstStyle/>
+          <a:p>
+            <a:r>
+              <a:rPr lang="en-MY" dirty="0"/>
+              <a:t>Bundling</a:t>
+            </a:r>
+          </a:p>
+          <a:p>
+            <a:pPr lvl="1"/>
+            <a:r>
+              <a:rPr lang="en-MY" dirty="0"/>
+              <a:t>E.g. Spend RM100 in Shop A to get 20% off ala carte items in Shop B</a:t>
+            </a:r>
+          </a:p>
+          <a:p>
+            <a:pPr lvl="1"/>
+            <a:r>
+              <a:rPr lang="en-MY" dirty="0"/>
+              <a:t>Show bundles and promotions (below) in app</a:t>
+            </a:r>
+          </a:p>
+          <a:p>
+            <a:r>
+              <a:rPr lang="en-MY" dirty="0"/>
+              <a:t>Promotions</a:t>
+            </a:r>
+          </a:p>
+          <a:p>
+            <a:pPr lvl="1"/>
+            <a:r>
+              <a:rPr lang="en-MY" dirty="0"/>
+              <a:t>Discount coupons, new releases</a:t>
+            </a:r>
+          </a:p>
+          <a:p>
+            <a:r>
+              <a:rPr lang="en-MY" dirty="0"/>
+              <a:t>Point Reward System</a:t>
+            </a:r>
+          </a:p>
+          <a:p>
+            <a:pPr lvl="1"/>
+            <a:r>
+              <a:rPr lang="en-MY" dirty="0"/>
+              <a:t>Point collection every time money is spent – Redemption of goods with points collected</a:t>
+            </a:r>
+          </a:p>
+          <a:p>
+            <a:pPr lvl="1"/>
+            <a:r>
+              <a:rPr lang="en-MY" dirty="0"/>
+              <a:t>User register themselves for point collection</a:t>
             </a:r>
           </a:p>
         </p:txBody>
@@ -6279,7 +6345,7 @@
     </p:spTree>
     <p:extLst>
       <p:ext uri="{BB962C8B-B14F-4D97-AF65-F5344CB8AC3E}">
-        <p14:creationId xmlns:p14="http://schemas.microsoft.com/office/powerpoint/2010/main" val="589647342"/>
+        <p14:creationId xmlns:p14="http://schemas.microsoft.com/office/powerpoint/2010/main" val="1859594646"/>
       </p:ext>
     </p:extLst>
   </p:cSld>
@@ -6311,7 +6377,7 @@
           <p:cNvPr id="2" name="Title 1">
             <a:extLst>
               <a:ext uri="{FF2B5EF4-FFF2-40B4-BE49-F238E27FC236}">
-                <a16:creationId xmlns:a16="http://schemas.microsoft.com/office/drawing/2014/main" id="{23E67E72-7AF9-45FB-A470-7B463588931E}"/>
+                <a16:creationId xmlns:a16="http://schemas.microsoft.com/office/drawing/2014/main" id="{336B133A-57CA-4908-975C-E5934E9FBE7D}"/>
               </a:ext>
             </a:extLst>
           </p:cNvPr>
@@ -6329,7 +6395,7 @@
           <a:p>
             <a:r>
               <a:rPr lang="en-MY" dirty="0"/>
-              <a:t>Execution</a:t>
+              <a:t>Features (Volume)</a:t>
             </a:r>
           </a:p>
         </p:txBody>
@@ -6339,7 +6405,7 @@
           <p:cNvPr id="3" name="Content Placeholder 2">
             <a:extLst>
               <a:ext uri="{FF2B5EF4-FFF2-40B4-BE49-F238E27FC236}">
-                <a16:creationId xmlns:a16="http://schemas.microsoft.com/office/drawing/2014/main" id="{0CA5EE96-200D-48ED-BCCC-D62DEFD8E523}"/>
+                <a16:creationId xmlns:a16="http://schemas.microsoft.com/office/drawing/2014/main" id="{9D37E16D-F92E-4598-94A7-0687DF8836B6}"/>
               </a:ext>
             </a:extLst>
           </p:cNvPr>
@@ -6352,24 +6418,68 @@
         </p:nvSpPr>
         <p:spPr/>
         <p:txBody>
-          <a:bodyPr/>
-          <a:lstStyle/>
-          <a:p>
-            <a:pPr marL="0" indent="0">
-              <a:buNone/>
-            </a:pPr>
-            <a:r>
-              <a:rPr lang="en-US" dirty="0"/>
-              <a:t>How are you going to take your opportunity and turn it into a business? This section will cover your marketing and sales plan, operations, and how you’re going to measure success.</a:t>
-            </a:r>
-            <a:endParaRPr lang="en-MY" dirty="0"/>
+          <a:bodyPr>
+            <a:normAutofit/>
+          </a:bodyPr>
+          <a:lstStyle/>
+          <a:p>
+            <a:r>
+              <a:rPr lang="en-MY" dirty="0"/>
+              <a:t>Store Locator</a:t>
+            </a:r>
+          </a:p>
+          <a:p>
+            <a:pPr lvl="1"/>
+            <a:r>
+              <a:rPr lang="en-MY" dirty="0"/>
+              <a:t>Digital interface in app</a:t>
+            </a:r>
+          </a:p>
+          <a:p>
+            <a:r>
+              <a:rPr lang="en-MY" dirty="0"/>
+              <a:t>Parking Assist</a:t>
+            </a:r>
+          </a:p>
+          <a:p>
+            <a:pPr lvl="1"/>
+            <a:r>
+              <a:rPr lang="en-MY" dirty="0"/>
+              <a:t>QR code pillar car tracking / Parking space locator</a:t>
+            </a:r>
+          </a:p>
+          <a:p>
+            <a:r>
+              <a:rPr lang="en-MY" dirty="0"/>
+              <a:t>Auxiliary Services</a:t>
+            </a:r>
+          </a:p>
+          <a:p>
+            <a:pPr lvl="1"/>
+            <a:r>
+              <a:rPr lang="en-MY" dirty="0"/>
+              <a:t>Wheelchair/Buggy ride/Child service information</a:t>
+            </a:r>
+          </a:p>
+          <a:p>
+            <a:r>
+              <a:rPr lang="en-MY" dirty="0"/>
+              <a:t>Event</a:t>
+            </a:r>
+          </a:p>
+          <a:p>
+            <a:pPr lvl="1"/>
+            <a:r>
+              <a:rPr lang="en-MY" dirty="0"/>
+              <a:t>Event information</a:t>
+            </a:r>
           </a:p>
         </p:txBody>
       </p:sp>
     </p:spTree>
     <p:extLst>
       <p:ext uri="{BB962C8B-B14F-4D97-AF65-F5344CB8AC3E}">
-        <p14:creationId xmlns:p14="http://schemas.microsoft.com/office/powerpoint/2010/main" val="2973776277"/>
+        <p14:creationId xmlns:p14="http://schemas.microsoft.com/office/powerpoint/2010/main" val="759244797"/>
       </p:ext>
     </p:extLst>
   </p:cSld>
@@ -6382,6 +6492,14 @@
 <file path=ppt/slides/slide8.xml><?xml version="1.0" encoding="utf-8"?>
 <p:sld xmlns:a="http://schemas.openxmlformats.org/drawingml/2006/main" xmlns:r="http://schemas.openxmlformats.org/officeDocument/2006/relationships" xmlns:p="http://schemas.openxmlformats.org/presentationml/2006/main">
   <p:cSld>
+    <p:bg>
+      <p:bgPr>
+        <a:solidFill>
+          <a:schemeClr val="bg1"/>
+        </a:solidFill>
+        <a:effectLst/>
+      </p:bgPr>
+    </p:bg>
     <p:spTree>
       <p:nvGrpSpPr>
         <p:cNvPr id="1" name=""/>
@@ -6401,7 +6519,7 @@
           <p:cNvPr id="2" name="Title 1">
             <a:extLst>
               <a:ext uri="{FF2B5EF4-FFF2-40B4-BE49-F238E27FC236}">
-                <a16:creationId xmlns:a16="http://schemas.microsoft.com/office/drawing/2014/main" id="{C8EB8826-6CE3-4EC7-B645-A61CAB49226E}"/>
+                <a16:creationId xmlns:a16="http://schemas.microsoft.com/office/drawing/2014/main" id="{CCE065C7-3FB7-4EC0-913B-7323D5944E45}"/>
               </a:ext>
             </a:extLst>
           </p:cNvPr>
@@ -6412,47 +6530,60 @@
             <p:ph type="title"/>
           </p:nvPr>
         </p:nvSpPr>
-        <p:spPr/>
-        <p:txBody>
-          <a:bodyPr/>
-          <a:lstStyle/>
-          <a:p>
-            <a:r>
-              <a:rPr lang="en-MY" dirty="0"/>
-              <a:t>Financial plan</a:t>
-            </a:r>
-          </a:p>
-        </p:txBody>
-      </p:sp>
-      <p:sp>
-        <p:nvSpPr>
-          <p:cNvPr id="3" name="Content Placeholder 2">
-            <a:extLst>
-              <a:ext uri="{FF2B5EF4-FFF2-40B4-BE49-F238E27FC236}">
-                <a16:creationId xmlns:a16="http://schemas.microsoft.com/office/drawing/2014/main" id="{71C42F28-A21D-4390-90D7-717247FEA797}"/>
-              </a:ext>
-            </a:extLst>
-          </p:cNvPr>
-          <p:cNvSpPr>
-            <a:spLocks noGrp="1"/>
-          </p:cNvSpPr>
-          <p:nvPr>
-            <p:ph idx="1"/>
-          </p:nvPr>
-        </p:nvSpPr>
-        <p:spPr/>
-        <p:txBody>
-          <a:bodyPr/>
-          <a:lstStyle/>
-          <a:p>
-            <a:endParaRPr lang="en-MY" dirty="0"/>
-          </a:p>
-        </p:txBody>
-      </p:sp>
+        <p:spPr>
+          <a:xfrm>
+            <a:off x="1118615" y="640081"/>
+            <a:ext cx="3377183" cy="3708895"/>
+          </a:xfrm>
+          <a:noFill/>
+        </p:spPr>
+        <p:txBody>
+          <a:bodyPr vert="horz" lIns="91440" tIns="45720" rIns="91440" bIns="45720" rtlCol="0" anchor="b">
+            <a:normAutofit/>
+          </a:bodyPr>
+          <a:lstStyle/>
+          <a:p>
+            <a:r>
+              <a:rPr lang="en-US" dirty="0"/>
+              <a:t>Use cases</a:t>
+            </a:r>
+          </a:p>
+        </p:txBody>
+      </p:sp>
+      <p:pic>
+        <p:nvPicPr>
+          <p:cNvPr id="7" name="Picture 6">
+            <a:extLst>
+              <a:ext uri="{FF2B5EF4-FFF2-40B4-BE49-F238E27FC236}">
+                <a16:creationId xmlns:a16="http://schemas.microsoft.com/office/drawing/2014/main" id="{B14DE818-4564-4C7E-8C92-314E6F1EB286}"/>
+              </a:ext>
+            </a:extLst>
+          </p:cNvPr>
+          <p:cNvPicPr>
+            <a:picLocks noChangeAspect="1"/>
+          </p:cNvPicPr>
+          <p:nvPr/>
+        </p:nvPicPr>
+        <p:blipFill>
+          <a:blip r:embed="rId2"/>
+          <a:stretch>
+            <a:fillRect/>
+          </a:stretch>
+        </p:blipFill>
+        <p:spPr>
+          <a:xfrm>
+            <a:off x="4175661" y="0"/>
+            <a:ext cx="7650678" cy="6858000"/>
+          </a:xfrm>
+          <a:prstGeom prst="rect">
+            <a:avLst/>
+          </a:prstGeom>
+        </p:spPr>
+      </p:pic>
     </p:spTree>
     <p:extLst>
       <p:ext uri="{BB962C8B-B14F-4D97-AF65-F5344CB8AC3E}">
-        <p14:creationId xmlns:p14="http://schemas.microsoft.com/office/powerpoint/2010/main" val="1643544967"/>
+        <p14:creationId xmlns:p14="http://schemas.microsoft.com/office/powerpoint/2010/main" val="872950829"/>
       </p:ext>
     </p:extLst>
   </p:cSld>
@@ -6484,7 +6615,7 @@
           <p:cNvPr id="2" name="Title 1">
             <a:extLst>
               <a:ext uri="{FF2B5EF4-FFF2-40B4-BE49-F238E27FC236}">
-                <a16:creationId xmlns:a16="http://schemas.microsoft.com/office/drawing/2014/main" id="{B71C4E1F-AA1F-48CA-B496-B8BCB12C82B8}"/>
+                <a16:creationId xmlns:a16="http://schemas.microsoft.com/office/drawing/2014/main" id="{41EA8939-4BF6-4C56-AEDF-57857230C98F}"/>
               </a:ext>
             </a:extLst>
           </p:cNvPr>
@@ -6502,68 +6633,45 @@
           <a:p>
             <a:r>
               <a:rPr lang="en-MY" dirty="0"/>
-              <a:t>Hypothesis</a:t>
-            </a:r>
-          </a:p>
-        </p:txBody>
-      </p:sp>
-      <p:sp>
-        <p:nvSpPr>
-          <p:cNvPr id="3" name="Content Placeholder 2">
-            <a:extLst>
-              <a:ext uri="{FF2B5EF4-FFF2-40B4-BE49-F238E27FC236}">
-                <a16:creationId xmlns:a16="http://schemas.microsoft.com/office/drawing/2014/main" id="{E6962A66-2322-43DF-8378-35FEE3F8889D}"/>
-              </a:ext>
-            </a:extLst>
-          </p:cNvPr>
-          <p:cNvSpPr>
-            <a:spLocks noGrp="1"/>
-          </p:cNvSpPr>
-          <p:nvPr>
-            <p:ph idx="1"/>
-          </p:nvPr>
-        </p:nvSpPr>
-        <p:spPr/>
-        <p:txBody>
-          <a:bodyPr/>
-          <a:lstStyle/>
-          <a:p>
-            <a:r>
-              <a:rPr lang="en-MY" dirty="0"/>
-              <a:t>Profitability problems of shop owners and landlords in the retail space can be solved by increasing the revenue of shop owners </a:t>
-            </a:r>
-            <a:r>
-              <a:rPr lang="en-MY" i="1" dirty="0"/>
-              <a:t>collectively</a:t>
-            </a:r>
-          </a:p>
-          <a:p>
-            <a:endParaRPr lang="en-MY" i="1" dirty="0"/>
-          </a:p>
-          <a:p>
-            <a:pPr marL="0" indent="0">
-              <a:buNone/>
-            </a:pPr>
-            <a:r>
-              <a:rPr lang="en-MY" dirty="0"/>
-              <a:t>Assumptions</a:t>
-            </a:r>
-          </a:p>
-          <a:p>
-            <a:r>
-              <a:rPr lang="en-MY" dirty="0"/>
-              <a:t>Retail space shop owners and landlords are in the shopping mall/commercial hub space</a:t>
-            </a:r>
-          </a:p>
-          <a:p>
-            <a:endParaRPr lang="en-MY" dirty="0"/>
-          </a:p>
-        </p:txBody>
-      </p:sp>
+              <a:t>Use Case Point Reward System</a:t>
+            </a:r>
+          </a:p>
+        </p:txBody>
+      </p:sp>
+      <p:pic>
+        <p:nvPicPr>
+          <p:cNvPr id="4" name="Picture 3">
+            <a:extLst>
+              <a:ext uri="{FF2B5EF4-FFF2-40B4-BE49-F238E27FC236}">
+                <a16:creationId xmlns:a16="http://schemas.microsoft.com/office/drawing/2014/main" id="{40673FEA-20DB-46F1-AB49-BE9731985DE3}"/>
+              </a:ext>
+            </a:extLst>
+          </p:cNvPr>
+          <p:cNvPicPr>
+            <a:picLocks noChangeAspect="1"/>
+          </p:cNvPicPr>
+          <p:nvPr/>
+        </p:nvPicPr>
+        <p:blipFill>
+          <a:blip r:embed="rId2"/>
+          <a:stretch>
+            <a:fillRect/>
+          </a:stretch>
+        </p:blipFill>
+        <p:spPr>
+          <a:xfrm>
+            <a:off x="1005840" y="1988026"/>
+            <a:ext cx="9928588" cy="4026535"/>
+          </a:xfrm>
+          <a:prstGeom prst="rect">
+            <a:avLst/>
+          </a:prstGeom>
+        </p:spPr>
+      </p:pic>
     </p:spTree>
     <p:extLst>
       <p:ext uri="{BB962C8B-B14F-4D97-AF65-F5344CB8AC3E}">
-        <p14:creationId xmlns:p14="http://schemas.microsoft.com/office/powerpoint/2010/main" val="1960683299"/>
+        <p14:creationId xmlns:p14="http://schemas.microsoft.com/office/powerpoint/2010/main" val="1286909431"/>
       </p:ext>
     </p:extLst>
   </p:cSld>

</xml_diff>